<commit_message>
added graPHS ANd other methods
</commit_message>
<xml_diff>
--- a/UREPosterAndAssignments/SMS DETECTION POSTER - ARMANDO OROZCO- SAC.pptx
+++ b/UREPosterAndAssignments/SMS DETECTION POSTER - ARMANDO OROZCO- SAC.pptx
@@ -257,7 +257,7 @@
               <a:pPr>
                 <a:defRPr/>
               </a:pPr>
-              <a:t>7/18/2024</a:t>
+              <a:t>7/23/2024</a:t>
             </a:fld>
             <a:endParaRPr lang="en-US" altLang="en-US"/>
           </a:p>
@@ -984,7 +984,7 @@
               <a:pPr>
                 <a:defRPr/>
               </a:pPr>
-              <a:t>7/18/2024</a:t>
+              <a:t>7/23/2024</a:t>
             </a:fld>
             <a:endParaRPr lang="en-US" altLang="en-US"/>
           </a:p>
@@ -1181,7 +1181,7 @@
               <a:pPr>
                 <a:defRPr/>
               </a:pPr>
-              <a:t>7/18/2024</a:t>
+              <a:t>7/23/2024</a:t>
             </a:fld>
             <a:endParaRPr lang="en-US" altLang="en-US"/>
           </a:p>
@@ -1388,7 +1388,7 @@
               <a:pPr>
                 <a:defRPr/>
               </a:pPr>
-              <a:t>7/18/2024</a:t>
+              <a:t>7/23/2024</a:t>
             </a:fld>
             <a:endParaRPr lang="en-US" altLang="en-US"/>
           </a:p>
@@ -1585,7 +1585,7 @@
               <a:pPr>
                 <a:defRPr/>
               </a:pPr>
-              <a:t>7/18/2024</a:t>
+              <a:t>7/23/2024</a:t>
             </a:fld>
             <a:endParaRPr lang="en-US" altLang="en-US"/>
           </a:p>
@@ -1856,7 +1856,7 @@
               <a:pPr>
                 <a:defRPr/>
               </a:pPr>
-              <a:t>7/18/2024</a:t>
+              <a:t>7/23/2024</a:t>
             </a:fld>
             <a:endParaRPr lang="en-US" altLang="en-US"/>
           </a:p>
@@ -2115,7 +2115,7 @@
               <a:pPr>
                 <a:defRPr/>
               </a:pPr>
-              <a:t>7/18/2024</a:t>
+              <a:t>7/23/2024</a:t>
             </a:fld>
             <a:endParaRPr lang="en-US" altLang="en-US"/>
           </a:p>
@@ -2509,7 +2509,7 @@
               <a:pPr>
                 <a:defRPr/>
               </a:pPr>
-              <a:t>7/18/2024</a:t>
+              <a:t>7/23/2024</a:t>
             </a:fld>
             <a:endParaRPr lang="en-US" altLang="en-US"/>
           </a:p>
@@ -2654,7 +2654,7 @@
               <a:pPr>
                 <a:defRPr/>
               </a:pPr>
-              <a:t>7/18/2024</a:t>
+              <a:t>7/23/2024</a:t>
             </a:fld>
             <a:endParaRPr lang="en-US" altLang="en-US"/>
           </a:p>
@@ -2776,7 +2776,7 @@
               <a:pPr>
                 <a:defRPr/>
               </a:pPr>
-              <a:t>7/18/2024</a:t>
+              <a:t>7/23/2024</a:t>
             </a:fld>
             <a:endParaRPr lang="en-US" altLang="en-US"/>
           </a:p>
@@ -3080,7 +3080,7 @@
               <a:pPr>
                 <a:defRPr/>
               </a:pPr>
-              <a:t>7/18/2024</a:t>
+              <a:t>7/23/2024</a:t>
             </a:fld>
             <a:endParaRPr lang="en-US" altLang="en-US"/>
           </a:p>
@@ -3366,7 +3366,7 @@
               <a:pPr>
                 <a:defRPr/>
               </a:pPr>
-              <a:t>7/18/2024</a:t>
+              <a:t>7/23/2024</a:t>
             </a:fld>
             <a:endParaRPr lang="en-US" altLang="en-US"/>
           </a:p>
@@ -3662,7 +3662,7 @@
               <a:pPr>
                 <a:defRPr/>
               </a:pPr>
-              <a:t>7/18/2024</a:t>
+              <a:t>7/23/2024</a:t>
             </a:fld>
             <a:endParaRPr lang="en-US" altLang="en-US"/>
           </a:p>
@@ -4381,7 +4381,7 @@
         </p:nvSpPr>
         <p:spPr bwMode="auto">
           <a:xfrm>
-            <a:off x="5103208" y="897457"/>
+            <a:off x="5103208" y="656827"/>
             <a:ext cx="28289169" cy="2646878"/>
           </a:xfrm>
           <a:prstGeom prst="rect">
@@ -4527,7 +4527,7 @@
                 <a:latin typeface="Arial" panose="020B0604020202020204" pitchFamily="34" charset="0"/>
                 <a:cs typeface="Arial" panose="020B0604020202020204" pitchFamily="34" charset="0"/>
               </a:rPr>
-              <a:t>SMS Classification using machine learning techniques</a:t>
+              <a:t>Spam Classification of SMSs using Machine Learning Techniques</a:t>
             </a:r>
           </a:p>
           <a:p>
@@ -4609,9 +4609,9 @@
         <p:grpSpPr bwMode="auto">
           <a:xfrm>
             <a:off x="363538" y="4278696"/>
-            <a:ext cx="14240654" cy="3756417"/>
+            <a:ext cx="14240654" cy="4679747"/>
             <a:chOff x="432287" y="4365904"/>
-            <a:chExt cx="13705567" cy="2028672"/>
+            <a:chExt cx="13705567" cy="2527321"/>
           </a:xfrm>
         </p:grpSpPr>
         <p:sp>
@@ -4625,7 +4625,7 @@
           <p:spPr bwMode="auto">
             <a:xfrm>
               <a:off x="432287" y="4848765"/>
-              <a:ext cx="13700233" cy="1545811"/>
+              <a:ext cx="13700233" cy="2044460"/>
             </a:xfrm>
             <a:prstGeom prst="rect">
               <a:avLst/>
@@ -4765,7 +4765,7 @@
                   <a:latin typeface="Arial" panose="020B0604020202020204" pitchFamily="34" charset="0"/>
                   <a:cs typeface="Arial" panose="020B0604020202020204" pitchFamily="34" charset="0"/>
                 </a:rPr>
-                <a:t>The advent of machine learning has revolutionized the way we approach text classification, particularly in the Short Message Service (SMS) domain. This research explores different machine learning algorithms to create a strong model for SMS classification. The goal is to apply sophisticated machine learning techniques to classify SMS content to improve the user experience and security within messaging applications.</a:t>
+                <a:t>The advent of machine learning has revolutionized the way we approach text classification, particularly in the Short Message Service (SMS) domain. This research explores different machine learning algorithms and techniques to analyze their effects on sentiment recognition, specifically if an SMS is undesirable. The goal is to apply and analyze sophisticated machine learning techniques to classify SMS content into Spam, or not Spam (Ham) and analyze the effects that every single technique has and if it is suitable to implement in a day-day application.</a:t>
               </a:r>
             </a:p>
           </p:txBody>
@@ -5009,57 +5009,6 @@
       </p:sp>
       <p:sp>
         <p:nvSpPr>
-          <p:cNvPr id="79" name="Rectangle 78"/>
-          <p:cNvSpPr/>
-          <p:nvPr/>
-        </p:nvSpPr>
-        <p:spPr>
-          <a:xfrm>
-            <a:off x="21346766" y="24299389"/>
-            <a:ext cx="885923" cy="1035974"/>
-          </a:xfrm>
-          <a:prstGeom prst="rect">
-            <a:avLst/>
-          </a:prstGeom>
-          <a:solidFill>
-            <a:schemeClr val="bg1"/>
-          </a:solidFill>
-          <a:ln>
-            <a:solidFill>
-              <a:schemeClr val="bg1"/>
-            </a:solidFill>
-          </a:ln>
-        </p:spPr>
-        <p:style>
-          <a:lnRef idx="2">
-            <a:schemeClr val="accent1">
-              <a:shade val="50000"/>
-            </a:schemeClr>
-          </a:lnRef>
-          <a:fillRef idx="1">
-            <a:schemeClr val="accent1"/>
-          </a:fillRef>
-          <a:effectRef idx="0">
-            <a:schemeClr val="accent1"/>
-          </a:effectRef>
-          <a:fontRef idx="minor">
-            <a:schemeClr val="lt1"/>
-          </a:fontRef>
-        </p:style>
-        <p:txBody>
-          <a:bodyPr rtlCol="0" anchor="ctr"/>
-          <a:lstStyle/>
-          <a:p>
-            <a:pPr algn="ctr"/>
-            <a:endParaRPr lang="en-US">
-              <a:latin typeface="Arial" panose="020B0604020202020204" pitchFamily="34" charset="0"/>
-              <a:cs typeface="Arial" panose="020B0604020202020204" pitchFamily="34" charset="0"/>
-            </a:endParaRPr>
-          </a:p>
-        </p:txBody>
-      </p:sp>
-      <p:sp>
-        <p:nvSpPr>
           <p:cNvPr id="81" name="Rectangle 80"/>
           <p:cNvSpPr/>
           <p:nvPr/>
@@ -5221,7 +5170,7 @@
         </p:nvGrpSpPr>
         <p:grpSpPr bwMode="auto">
           <a:xfrm>
-            <a:off x="363538" y="8700230"/>
+            <a:off x="363538" y="8988986"/>
             <a:ext cx="14240654" cy="23875270"/>
             <a:chOff x="432287" y="4365904"/>
             <a:chExt cx="13705567" cy="12998947"/>
@@ -7459,7 +7408,7 @@
         </p:nvGrpSpPr>
         <p:grpSpPr bwMode="auto">
           <a:xfrm>
-            <a:off x="14645820" y="17329147"/>
+            <a:off x="14645820" y="27243169"/>
             <a:ext cx="14240654" cy="6064739"/>
             <a:chOff x="432287" y="4365904"/>
             <a:chExt cx="13705567" cy="3275292"/>
@@ -7989,9 +7938,9 @@
         <p:grpSpPr bwMode="auto">
           <a:xfrm>
             <a:off x="14796147" y="4278696"/>
-            <a:ext cx="14240654" cy="12528049"/>
+            <a:ext cx="14240654" cy="11143055"/>
             <a:chOff x="432287" y="4365904"/>
-            <a:chExt cx="13705567" cy="6765834"/>
+            <a:chExt cx="13705567" cy="6017861"/>
           </a:xfrm>
         </p:grpSpPr>
         <p:sp>
@@ -8011,7 +7960,7 @@
           <p:spPr bwMode="auto">
             <a:xfrm>
               <a:off x="432287" y="4848764"/>
-              <a:ext cx="13700233" cy="6282974"/>
+              <a:ext cx="13700233" cy="5535001"/>
             </a:xfrm>
             <a:prstGeom prst="rect">
               <a:avLst/>
@@ -8197,6 +8146,10 @@
                 </a:rPr>
                 <a:t>The process of embedding is the process to give sentiment to words and thus sentences, there are several techniques to give sentiment to words, and a handful of them were applied to observe their effects during the training. The techniques that were applied were:</a:t>
               </a:r>
+              <a:endParaRPr lang="en-US" sz="3000" b="1" dirty="0">
+                <a:latin typeface="Arial" panose="020B0604020202020204" pitchFamily="34" charset="0"/>
+                <a:cs typeface="Arial" panose="020B0604020202020204" pitchFamily="34" charset="0"/>
+              </a:endParaRPr>
             </a:p>
             <a:p>
               <a:pPr lvl="2">
@@ -8208,7 +8161,7 @@
                   <a:latin typeface="Arial" panose="020B0604020202020204" pitchFamily="34" charset="0"/>
                   <a:cs typeface="Arial" panose="020B0604020202020204" pitchFamily="34" charset="0"/>
                 </a:rPr>
-                <a:t>Word2Vec</a:t>
+                <a:t>Count Vectorizer</a:t>
               </a:r>
             </a:p>
             <a:p>
@@ -8234,7 +8187,7 @@
                   <a:latin typeface="Arial" panose="020B0604020202020204" pitchFamily="34" charset="0"/>
                   <a:cs typeface="Arial" panose="020B0604020202020204" pitchFamily="34" charset="0"/>
                 </a:rPr>
-                <a:t>Count Vectorizer*</a:t>
+                <a:t>TF-IDF</a:t>
               </a:r>
             </a:p>
             <a:p>
@@ -8243,11 +8196,11 @@
                 <a:buChar char="•"/>
               </a:pPr>
               <a:r>
-                <a:rPr lang="en-US" sz="3000" b="1" dirty="0">
-                  <a:latin typeface="Arial" panose="020B0604020202020204" pitchFamily="34" charset="0"/>
-                  <a:cs typeface="Arial" panose="020B0604020202020204" pitchFamily="34" charset="0"/>
-                </a:rPr>
-                <a:t>TF-IDF*</a:t>
+                <a:rPr lang="en-US" sz="3000" b="1">
+                  <a:latin typeface="Arial" panose="020B0604020202020204" pitchFamily="34" charset="0"/>
+                  <a:cs typeface="Arial" panose="020B0604020202020204" pitchFamily="34" charset="0"/>
+                </a:rPr>
+                <a:t>Hashing vectorizer</a:t>
               </a:r>
             </a:p>
             <a:p>
@@ -8255,33 +8208,6 @@
                 <a:buFont typeface="Arial" panose="020B0604020202020204" pitchFamily="34" charset="0"/>
                 <a:buChar char="•"/>
               </a:pPr>
-              <a:r>
-                <a:rPr lang="en-US" sz="3000" b="1" dirty="0">
-                  <a:latin typeface="Arial" panose="020B0604020202020204" pitchFamily="34" charset="0"/>
-                  <a:cs typeface="Arial" panose="020B0604020202020204" pitchFamily="34" charset="0"/>
-                </a:rPr>
-                <a:t>Hashing vectorizer*</a:t>
-              </a:r>
-            </a:p>
-            <a:p>
-              <a:pPr lvl="2">
-                <a:buFont typeface="Arial" panose="020B0604020202020204" pitchFamily="34" charset="0"/>
-                <a:buChar char="•"/>
-              </a:pPr>
-              <a:r>
-                <a:rPr lang="en-US" sz="3000" b="1" dirty="0" err="1">
-                  <a:latin typeface="Arial" panose="020B0604020202020204" pitchFamily="34" charset="0"/>
-                  <a:cs typeface="Arial" panose="020B0604020202020204" pitchFamily="34" charset="0"/>
-                </a:rPr>
-                <a:t>GloVe</a:t>
-              </a:r>
-              <a:endParaRPr lang="en-US" sz="3000" b="1" dirty="0">
-                <a:latin typeface="Arial" panose="020B0604020202020204" pitchFamily="34" charset="0"/>
-                <a:cs typeface="Arial" panose="020B0604020202020204" pitchFamily="34" charset="0"/>
-              </a:endParaRPr>
-            </a:p>
-            <a:p>
-              <a:pPr marL="914400" lvl="2" indent="0"/>
               <a:endParaRPr lang="en-US" sz="3000" b="1" dirty="0">
                 <a:latin typeface="Arial" panose="020B0604020202020204" pitchFamily="34" charset="0"/>
                 <a:cs typeface="Arial" panose="020B0604020202020204" pitchFamily="34" charset="0"/>
@@ -8323,7 +8249,7 @@
                   <a:latin typeface="Arial" panose="020B0604020202020204" pitchFamily="34" charset="0"/>
                   <a:cs typeface="Arial" panose="020B0604020202020204" pitchFamily="34" charset="0"/>
                 </a:rPr>
-                <a:t>Naive Bayes Classification</a:t>
+                <a:t>Naive Bayes Classifier</a:t>
               </a:r>
             </a:p>
             <a:p>
@@ -8336,7 +8262,7 @@
                   <a:latin typeface="Arial" panose="020B0604020202020204" pitchFamily="34" charset="0"/>
                   <a:cs typeface="Arial" panose="020B0604020202020204" pitchFamily="34" charset="0"/>
                 </a:rPr>
-                <a:t>K-Nearest neighbors</a:t>
+                <a:t>K-Nearest neighbors Classifier</a:t>
               </a:r>
             </a:p>
             <a:p>
@@ -8349,7 +8275,7 @@
                   <a:latin typeface="Arial" panose="020B0604020202020204" pitchFamily="34" charset="0"/>
                   <a:cs typeface="Arial" panose="020B0604020202020204" pitchFamily="34" charset="0"/>
                 </a:rPr>
-                <a:t>Decision Tree Classification</a:t>
+                <a:t>Decision Tree Classifier</a:t>
               </a:r>
             </a:p>
             <a:p>
@@ -8362,20 +8288,7 @@
                   <a:latin typeface="Arial" panose="020B0604020202020204" pitchFamily="34" charset="0"/>
                   <a:cs typeface="Arial" panose="020B0604020202020204" pitchFamily="34" charset="0"/>
                 </a:rPr>
-                <a:t>Random Forest Classification</a:t>
-              </a:r>
-            </a:p>
-            <a:p>
-              <a:pPr lvl="2">
-                <a:buFont typeface="Arial" panose="020B0604020202020204" pitchFamily="34" charset="0"/>
-                <a:buChar char="•"/>
-              </a:pPr>
-              <a:r>
-                <a:rPr lang="en-US" sz="3000" b="1" dirty="0">
-                  <a:latin typeface="Arial" panose="020B0604020202020204" pitchFamily="34" charset="0"/>
-                  <a:cs typeface="Arial" panose="020B0604020202020204" pitchFamily="34" charset="0"/>
-                </a:rPr>
-                <a:t>Densely-connected Neural Network</a:t>
+                <a:t>Random Forest Classifier</a:t>
               </a:r>
             </a:p>
             <a:p>

</xml_diff>

<commit_message>
update poster and readme
</commit_message>
<xml_diff>
--- a/UREPosterAndAssignments/SMS DETECTION POSTER - ARMANDO OROZCO- SAC.pptx
+++ b/UREPosterAndAssignments/SMS DETECTION POSTER - ARMANDO OROZCO- SAC.pptx
@@ -257,7 +257,7 @@
               <a:pPr>
                 <a:defRPr/>
               </a:pPr>
-              <a:t>7/25/2024</a:t>
+              <a:t>7/26/2024</a:t>
             </a:fld>
             <a:endParaRPr lang="en-US" altLang="en-US"/>
           </a:p>
@@ -984,7 +984,7 @@
               <a:pPr>
                 <a:defRPr/>
               </a:pPr>
-              <a:t>7/25/2024</a:t>
+              <a:t>7/26/2024</a:t>
             </a:fld>
             <a:endParaRPr lang="en-US" altLang="en-US"/>
           </a:p>
@@ -1181,7 +1181,7 @@
               <a:pPr>
                 <a:defRPr/>
               </a:pPr>
-              <a:t>7/25/2024</a:t>
+              <a:t>7/26/2024</a:t>
             </a:fld>
             <a:endParaRPr lang="en-US" altLang="en-US"/>
           </a:p>
@@ -1388,7 +1388,7 @@
               <a:pPr>
                 <a:defRPr/>
               </a:pPr>
-              <a:t>7/25/2024</a:t>
+              <a:t>7/26/2024</a:t>
             </a:fld>
             <a:endParaRPr lang="en-US" altLang="en-US"/>
           </a:p>
@@ -1585,7 +1585,7 @@
               <a:pPr>
                 <a:defRPr/>
               </a:pPr>
-              <a:t>7/25/2024</a:t>
+              <a:t>7/26/2024</a:t>
             </a:fld>
             <a:endParaRPr lang="en-US" altLang="en-US"/>
           </a:p>
@@ -1856,7 +1856,7 @@
               <a:pPr>
                 <a:defRPr/>
               </a:pPr>
-              <a:t>7/25/2024</a:t>
+              <a:t>7/26/2024</a:t>
             </a:fld>
             <a:endParaRPr lang="en-US" altLang="en-US"/>
           </a:p>
@@ -2115,7 +2115,7 @@
               <a:pPr>
                 <a:defRPr/>
               </a:pPr>
-              <a:t>7/25/2024</a:t>
+              <a:t>7/26/2024</a:t>
             </a:fld>
             <a:endParaRPr lang="en-US" altLang="en-US"/>
           </a:p>
@@ -2509,7 +2509,7 @@
               <a:pPr>
                 <a:defRPr/>
               </a:pPr>
-              <a:t>7/25/2024</a:t>
+              <a:t>7/26/2024</a:t>
             </a:fld>
             <a:endParaRPr lang="en-US" altLang="en-US"/>
           </a:p>
@@ -2654,7 +2654,7 @@
               <a:pPr>
                 <a:defRPr/>
               </a:pPr>
-              <a:t>7/25/2024</a:t>
+              <a:t>7/26/2024</a:t>
             </a:fld>
             <a:endParaRPr lang="en-US" altLang="en-US"/>
           </a:p>
@@ -2776,7 +2776,7 @@
               <a:pPr>
                 <a:defRPr/>
               </a:pPr>
-              <a:t>7/25/2024</a:t>
+              <a:t>7/26/2024</a:t>
             </a:fld>
             <a:endParaRPr lang="en-US" altLang="en-US"/>
           </a:p>
@@ -3080,7 +3080,7 @@
               <a:pPr>
                 <a:defRPr/>
               </a:pPr>
-              <a:t>7/25/2024</a:t>
+              <a:t>7/26/2024</a:t>
             </a:fld>
             <a:endParaRPr lang="en-US" altLang="en-US"/>
           </a:p>
@@ -3366,7 +3366,7 @@
               <a:pPr>
                 <a:defRPr/>
               </a:pPr>
-              <a:t>7/25/2024</a:t>
+              <a:t>7/26/2024</a:t>
             </a:fld>
             <a:endParaRPr lang="en-US" altLang="en-US"/>
           </a:p>
@@ -3662,7 +3662,7 @@
               <a:pPr>
                 <a:defRPr/>
               </a:pPr>
-              <a:t>7/25/2024</a:t>
+              <a:t>7/26/2024</a:t>
             </a:fld>
             <a:endParaRPr lang="en-US" altLang="en-US"/>
           </a:p>
@@ -4765,21 +4765,7 @@
                   <a:latin typeface="Arial" panose="020B0604020202020204" pitchFamily="34" charset="0"/>
                   <a:cs typeface="Arial" panose="020B0604020202020204" pitchFamily="34" charset="0"/>
                 </a:rPr>
-                <a:t>The advent of machine learning has revolutionized the way we approach text classification, particularly in the Short Message Service (SMS) domain. This research explores different machine learning algorithms and techniques to analyze their effects on sentiment recognition, specifically if an SMS message is undesirable. An undesired message that could possibly be malicious </a:t>
-              </a:r>
-              <a:r>
-                <a:rPr lang="en-US" altLang="en-US" sz="3000">
-                  <a:latin typeface="Arial" panose="020B0604020202020204" pitchFamily="34" charset="0"/>
-                  <a:cs typeface="Arial" panose="020B0604020202020204" pitchFamily="34" charset="0"/>
-                </a:rPr>
-                <a:t>is called . </a:t>
-              </a:r>
-              <a:r>
-                <a:rPr lang="en-US" altLang="en-US" sz="3000" dirty="0">
-                  <a:latin typeface="Arial" panose="020B0604020202020204" pitchFamily="34" charset="0"/>
-                  <a:cs typeface="Arial" panose="020B0604020202020204" pitchFamily="34" charset="0"/>
-                </a:rPr>
-                <a:t>The goal is to apply and analyze sophisticated machine learning techniques to classify SMS content into Spam, or not Spam (Ham) and analyze the effects that every single technique has and if it is suitable to implement in a day-day application.</a:t>
+                <a:t>The advent of machine learning has revolutionized the way we approach text classification, particularly in the Short Message Service (SMS) domain. This research explores different machine learning algorithms and techniques to analyze their effects on sentiment recognition, specifically if an SMS message is undesirable. An undesired message that could possibly be malicious is called . The goal is to apply and analyze sophisticated machine learning techniques to classify SMS content into Spam, or not Spam (Ham) and analyze the effects that every single technique has and if it is suitable to implement in a day-day application.</a:t>
               </a:r>
             </a:p>
           </p:txBody>
@@ -5184,10 +5170,10 @@
         </p:nvGrpSpPr>
         <p:grpSpPr bwMode="auto">
           <a:xfrm>
-            <a:off x="363538" y="8988986"/>
-            <a:ext cx="14240654" cy="23875270"/>
-            <a:chOff x="432287" y="4365904"/>
-            <a:chExt cx="13705567" cy="12998947"/>
+            <a:off x="363538" y="9677256"/>
+            <a:ext cx="14235112" cy="22685383"/>
+            <a:chOff x="432287" y="4361588"/>
+            <a:chExt cx="13700233" cy="12351110"/>
           </a:xfrm>
         </p:grpSpPr>
         <p:sp>
@@ -5201,7 +5187,7 @@
           <p:spPr bwMode="auto">
             <a:xfrm>
               <a:off x="432287" y="4848765"/>
-              <a:ext cx="13700233" cy="12516086"/>
+              <a:ext cx="13700233" cy="11863933"/>
             </a:xfrm>
             <a:prstGeom prst="rect">
               <a:avLst/>
@@ -5334,13 +5320,6 @@
                 </a:defRPr>
               </a:lvl9pPr>
             </a:lstStyle>
-            <a:p>
-              <a:pPr marL="0" indent="0"/>
-              <a:endParaRPr lang="en-US" sz="3000" strike="sngStrike" dirty="0">
-                <a:latin typeface="Arial" panose="020B0604020202020204" pitchFamily="34" charset="0"/>
-                <a:cs typeface="Arial" panose="020B0604020202020204" pitchFamily="34" charset="0"/>
-              </a:endParaRPr>
-            </a:p>
             <a:p>
               <a:pPr>
                 <a:buFont typeface="Arial" panose="020B0604020202020204" pitchFamily="34" charset="0"/>
@@ -5483,7 +5462,7 @@
                   <a:latin typeface="Arial" panose="020B0604020202020204" pitchFamily="34" charset="0"/>
                   <a:cs typeface="Arial" panose="020B0604020202020204" pitchFamily="34" charset="0"/>
                 </a:rPr>
-                <a:t> for machine learning models, and some NLP techniques, and finally, </a:t>
+                <a:t> for machine learning models. Some NLP techniques, and finally, </a:t>
               </a:r>
               <a:r>
                 <a:rPr lang="en-US" sz="3000" b="1" dirty="0">
@@ -5497,7 +5476,7 @@
                   <a:latin typeface="Arial" panose="020B0604020202020204" pitchFamily="34" charset="0"/>
                   <a:cs typeface="Arial" panose="020B0604020202020204" pitchFamily="34" charset="0"/>
                 </a:rPr>
-                <a:t> provided some NLP tokenization techniques in specific the ‘</a:t>
+                <a:t> provided some NLP tokenization techniques specific to the ‘</a:t>
               </a:r>
               <a:r>
                 <a:rPr lang="en-US" sz="3000" b="1" dirty="0" err="1">
@@ -5561,42 +5540,8 @@
                   <a:latin typeface="Arial" panose="020B0604020202020204" pitchFamily="34" charset="0"/>
                   <a:cs typeface="Arial" panose="020B0604020202020204" pitchFamily="34" charset="0"/>
                 </a:rPr>
-                <a:t>The data was collected from different sources to have less biased results two data sets were selected. The first data set was selected from the UCI machine-learning repository</a:t>
+                <a:t>Data was collected from the UCI machine learning repository and a paper by Mishra, S, &amp; Soni. The second dataset is simplified by removing the 'URL', 'PHONE', and 'EMAIL' columns, as the focus is on NLP techniques without external information.</a:t>
               </a:r>
-              <a:r>
-                <a:rPr lang="en-US" sz="3000" baseline="30000" dirty="0">
-                  <a:latin typeface="Arial" panose="020B0604020202020204" pitchFamily="34" charset="0"/>
-                  <a:cs typeface="Arial" panose="020B0604020202020204" pitchFamily="34" charset="0"/>
-                </a:rPr>
-                <a:t>1</a:t>
-              </a:r>
-              <a:r>
-                <a:rPr lang="en-US" sz="3000" dirty="0">
-                  <a:latin typeface="Arial" panose="020B0604020202020204" pitchFamily="34" charset="0"/>
-                  <a:cs typeface="Arial" panose="020B0604020202020204" pitchFamily="34" charset="0"/>
-                </a:rPr>
-                <a:t>, and the second data set was collected from Mishra, S, &amp; Soni, D. paper</a:t>
-              </a:r>
-              <a:r>
-                <a:rPr lang="en-US" sz="3000" baseline="30000" dirty="0">
-                  <a:latin typeface="Arial" panose="020B0604020202020204" pitchFamily="34" charset="0"/>
-                  <a:cs typeface="Arial" panose="020B0604020202020204" pitchFamily="34" charset="0"/>
-                </a:rPr>
-                <a:t>2</a:t>
-              </a:r>
-              <a:r>
-                <a:rPr lang="en-US" sz="3000" dirty="0">
-                  <a:latin typeface="Arial" panose="020B0604020202020204" pitchFamily="34" charset="0"/>
-                  <a:cs typeface="Arial" panose="020B0604020202020204" pitchFamily="34" charset="0"/>
-                </a:rPr>
-                <a:t>, in which several techniques are discussed to solve this problem. In the particular case of this experiment, the second data set was simplified as the columns ‘URL’, ‘PHONE’, and ‘EMAIL’, were unnecessary, since the point of this research is to explore text data without external information, only using NLP techniques, the use of external variables or features are discouraged.</a:t>
-              </a:r>
-            </a:p>
-            <a:p>
-              <a:pPr>
-                <a:buFont typeface="Arial" panose="020B0604020202020204" pitchFamily="34" charset="0"/>
-                <a:buChar char="•"/>
-              </a:pPr>
               <a:endParaRPr lang="en-US" sz="3000" b="1" dirty="0">
                 <a:latin typeface="Arial" panose="020B0604020202020204" pitchFamily="34" charset="0"/>
                 <a:cs typeface="Arial" panose="020B0604020202020204" pitchFamily="34" charset="0"/>
@@ -5760,6 +5705,43 @@
                 </a:rPr>
                 <a:t>After the words were lemmatized and the stop words were removed, the remaining words were turned into numbers, for example. The word “hello” = 1, and “book” = 2, this would be repeated with all words. After every word was assigned a number, all sentences were rewritten with their respective word-to-number translation</a:t>
               </a:r>
+            </a:p>
+            <a:p>
+              <a:pPr lvl="1">
+                <a:buFont typeface="Arial" panose="020B0604020202020204" pitchFamily="34" charset="0"/>
+                <a:buChar char="•"/>
+              </a:pPr>
+              <a:r>
+                <a:rPr lang="en-US" sz="3000" b="1" dirty="0">
+                  <a:latin typeface="Arial" panose="020B0604020202020204" pitchFamily="34" charset="0"/>
+                  <a:cs typeface="Arial" panose="020B0604020202020204" pitchFamily="34" charset="0"/>
+                </a:rPr>
+                <a:t>Padding:</a:t>
+              </a:r>
+              <a:r>
+                <a:rPr lang="en-US" sz="3000" dirty="0">
+                  <a:latin typeface="Arial" panose="020B0604020202020204" pitchFamily="34" charset="0"/>
+                  <a:cs typeface="Arial" panose="020B0604020202020204" pitchFamily="34" charset="0"/>
+                </a:rPr>
+                <a:t> After the tokenization and the lemmatization, the sentences need to be converted to lists of the same length, a padding algorithm was provided by the </a:t>
+              </a:r>
+              <a:r>
+                <a:rPr lang="en-US" sz="3000" b="1" dirty="0">
+                  <a:latin typeface="Arial" panose="020B0604020202020204" pitchFamily="34" charset="0"/>
+                  <a:cs typeface="Arial" panose="020B0604020202020204" pitchFamily="34" charset="0"/>
+                </a:rPr>
+                <a:t>TensorFlow </a:t>
+              </a:r>
+              <a:r>
+                <a:rPr lang="en-US" sz="3000" dirty="0">
+                  <a:latin typeface="Arial" panose="020B0604020202020204" pitchFamily="34" charset="0"/>
+                  <a:cs typeface="Arial" panose="020B0604020202020204" pitchFamily="34" charset="0"/>
+                </a:rPr>
+                <a:t>library</a:t>
+              </a:r>
+            </a:p>
+            <a:p>
+              <a:pPr marL="457200" lvl="1" indent="0"/>
               <a:endParaRPr lang="en-US" sz="3000" b="1" dirty="0">
                 <a:latin typeface="Arial" panose="020B0604020202020204" pitchFamily="34" charset="0"/>
                 <a:cs typeface="Arial" panose="020B0604020202020204" pitchFamily="34" charset="0"/>
@@ -5784,7 +5766,7 @@
           </p:nvSpPr>
           <p:spPr bwMode="auto">
             <a:xfrm>
-              <a:off x="437621" y="4365904"/>
+              <a:off x="432287" y="4361588"/>
               <a:ext cx="13700233" cy="448784"/>
             </a:xfrm>
             <a:prstGeom prst="rect">
@@ -5937,7 +5919,7 @@
         </p:nvGrpSpPr>
         <p:grpSpPr bwMode="auto">
           <a:xfrm>
-            <a:off x="29223214" y="4275403"/>
+            <a:off x="29292552" y="16787004"/>
             <a:ext cx="14240655" cy="3294752"/>
             <a:chOff x="432287" y="4365904"/>
             <a:chExt cx="13705568" cy="1779348"/>
@@ -6276,7 +6258,7 @@
         </p:nvGrpSpPr>
         <p:grpSpPr bwMode="auto">
           <a:xfrm>
-            <a:off x="29239839" y="15939131"/>
+            <a:off x="29426248" y="19884435"/>
             <a:ext cx="14240655" cy="2371424"/>
             <a:chOff x="432287" y="4365904"/>
             <a:chExt cx="13705568" cy="1280700"/>
@@ -6615,7 +6597,7 @@
         </p:nvGrpSpPr>
         <p:grpSpPr bwMode="auto">
           <a:xfrm>
-            <a:off x="29239839" y="20183080"/>
+            <a:off x="29431791" y="22755314"/>
             <a:ext cx="14240655" cy="7449738"/>
             <a:chOff x="432287" y="4365904"/>
             <a:chExt cx="13705568" cy="4023269"/>
@@ -7086,10 +7068,10 @@
         </p:nvGrpSpPr>
         <p:grpSpPr bwMode="auto">
           <a:xfrm>
-            <a:off x="29239839" y="29649519"/>
-            <a:ext cx="14240655" cy="2371424"/>
-            <a:chOff x="432287" y="4365904"/>
-            <a:chExt cx="13705568" cy="1280700"/>
+            <a:off x="29437335" y="30515979"/>
+            <a:ext cx="14287825" cy="2402421"/>
+            <a:chOff x="432287" y="4349164"/>
+            <a:chExt cx="13750966" cy="1297440"/>
           </a:xfrm>
         </p:grpSpPr>
         <p:sp>
@@ -7269,7 +7251,7 @@
           </p:nvSpPr>
           <p:spPr bwMode="auto">
             <a:xfrm>
-              <a:off x="437621" y="4365904"/>
+              <a:off x="483019" y="4349164"/>
               <a:ext cx="13700234" cy="448784"/>
             </a:xfrm>
             <a:prstGeom prst="rect">
@@ -7422,10 +7404,10 @@
         </p:nvGrpSpPr>
         <p:grpSpPr bwMode="auto">
           <a:xfrm>
-            <a:off x="14645820" y="27243169"/>
-            <a:ext cx="14240654" cy="6064739"/>
-            <a:chOff x="432287" y="4365904"/>
-            <a:chExt cx="13705567" cy="3275292"/>
+            <a:off x="15024581" y="25455243"/>
+            <a:ext cx="14267971" cy="6077839"/>
+            <a:chOff x="432287" y="4358829"/>
+            <a:chExt cx="13731857" cy="3282367"/>
           </a:xfrm>
         </p:grpSpPr>
         <p:sp>
@@ -7652,7 +7634,7 @@
           </p:nvSpPr>
           <p:spPr bwMode="auto">
             <a:xfrm>
-              <a:off x="437621" y="4365904"/>
+              <a:off x="463911" y="4358829"/>
               <a:ext cx="13700233" cy="448784"/>
             </a:xfrm>
             <a:prstGeom prst="rect">
@@ -7952,9 +7934,9 @@
         <p:grpSpPr bwMode="auto">
           <a:xfrm>
             <a:off x="14796147" y="4278696"/>
-            <a:ext cx="14240654" cy="11143055"/>
+            <a:ext cx="14240654" cy="9758059"/>
             <a:chOff x="432287" y="4365904"/>
-            <a:chExt cx="13705567" cy="6017861"/>
+            <a:chExt cx="13705567" cy="5269887"/>
           </a:xfrm>
         </p:grpSpPr>
         <p:sp>
@@ -7974,7 +7956,7 @@
           <p:spPr bwMode="auto">
             <a:xfrm>
               <a:off x="432287" y="4848764"/>
-              <a:ext cx="13700233" cy="5535001"/>
+              <a:ext cx="13700233" cy="4787027"/>
             </a:xfrm>
             <a:prstGeom prst="rect">
               <a:avLst/>
@@ -8107,40 +8089,6 @@
                 </a:defRPr>
               </a:lvl9pPr>
             </a:lstStyle>
-            <a:p>
-              <a:pPr marL="914400" lvl="1" indent="-457200">
-                <a:buFont typeface="Arial" panose="020B0604020202020204" pitchFamily="34" charset="0"/>
-                <a:buChar char="•"/>
-              </a:pPr>
-              <a:r>
-                <a:rPr lang="en-US" sz="3000" b="1" dirty="0">
-                  <a:latin typeface="Arial" panose="020B0604020202020204" pitchFamily="34" charset="0"/>
-                  <a:cs typeface="Arial" panose="020B0604020202020204" pitchFamily="34" charset="0"/>
-                </a:rPr>
-                <a:t>Padding:</a:t>
-              </a:r>
-              <a:r>
-                <a:rPr lang="en-US" sz="3000" dirty="0">
-                  <a:latin typeface="Arial" panose="020B0604020202020204" pitchFamily="34" charset="0"/>
-                  <a:cs typeface="Arial" panose="020B0604020202020204" pitchFamily="34" charset="0"/>
-                </a:rPr>
-                <a:t> After the tokenization and the lemmatization, the sentences need to be converted to lists of the same length, a padding algorithm was provided by the </a:t>
-              </a:r>
-              <a:r>
-                <a:rPr lang="en-US" sz="3000" b="1" dirty="0">
-                  <a:latin typeface="Arial" panose="020B0604020202020204" pitchFamily="34" charset="0"/>
-                  <a:cs typeface="Arial" panose="020B0604020202020204" pitchFamily="34" charset="0"/>
-                </a:rPr>
-                <a:t>TensorFlow </a:t>
-              </a:r>
-              <a:r>
-                <a:rPr lang="en-US" sz="3000" dirty="0">
-                  <a:latin typeface="Arial" panose="020B0604020202020204" pitchFamily="34" charset="0"/>
-                  <a:cs typeface="Arial" panose="020B0604020202020204" pitchFamily="34" charset="0"/>
-                </a:rPr>
-                <a:t>library</a:t>
-              </a:r>
-            </a:p>
             <a:p>
               <a:pPr lvl="1">
                 <a:buFont typeface="Arial" panose="020B0604020202020204" pitchFamily="34" charset="0"/>
@@ -8486,6 +8434,42 @@
           </p:txBody>
         </p:sp>
       </p:grpSp>
+      <p:pic>
+        <p:nvPicPr>
+          <p:cNvPr id="9" name="Picture 8" descr="A diagram of the process">
+            <a:extLst>
+              <a:ext uri="{FF2B5EF4-FFF2-40B4-BE49-F238E27FC236}">
+                <a16:creationId xmlns:a16="http://schemas.microsoft.com/office/drawing/2014/main" id="{63D02D34-C393-6F50-0B9A-134BD5AF7301}"/>
+              </a:ext>
+            </a:extLst>
+          </p:cNvPr>
+          <p:cNvPicPr>
+            <a:picLocks noChangeAspect="1"/>
+          </p:cNvPicPr>
+          <p:nvPr/>
+        </p:nvPicPr>
+        <p:blipFill>
+          <a:blip r:embed="rId8">
+            <a:extLst>
+              <a:ext uri="{28A0092B-C50C-407E-A947-70E740481C1C}">
+                <a14:useLocalDpi xmlns:a14="http://schemas.microsoft.com/office/drawing/2010/main" val="0"/>
+              </a:ext>
+            </a:extLst>
+          </a:blip>
+          <a:stretch>
+            <a:fillRect/>
+          </a:stretch>
+        </p:blipFill>
+        <p:spPr>
+          <a:xfrm>
+            <a:off x="15024581" y="13103875"/>
+            <a:ext cx="12587920" cy="11010846"/>
+          </a:xfrm>
+          <a:prstGeom prst="rect">
+            <a:avLst/>
+          </a:prstGeom>
+        </p:spPr>
+      </p:pic>
     </p:spTree>
   </p:cSld>
   <p:clrMapOvr>

</xml_diff>

<commit_message>
added word document with abstract and title
</commit_message>
<xml_diff>
--- a/UREPosterAndAssignments/SMS DETECTION POSTER - ARMANDO OROZCO- SAC.pptx
+++ b/UREPosterAndAssignments/SMS DETECTION POSTER - ARMANDO OROZCO- SAC.pptx
@@ -257,7 +257,7 @@
               <a:pPr>
                 <a:defRPr/>
               </a:pPr>
-              <a:t>7/26/2024</a:t>
+              <a:t>7/27/2024</a:t>
             </a:fld>
             <a:endParaRPr lang="en-US" altLang="en-US"/>
           </a:p>
@@ -610,14 +610,14 @@
           </a:ln>
           <a:extLst>
             <a:ext uri="{909E8E84-426E-40dd-AFC4-6F175D3DCCD1}">
-              <a14:hiddenFill xmlns="" xmlns:a14="http://schemas.microsoft.com/office/drawing/2010/main">
+              <a14:hiddenFill xmlns:a14="http://schemas.microsoft.com/office/drawing/2010/main" xmlns="">
                 <a:solidFill>
                   <a:srgbClr val="FFFFFF"/>
                 </a:solidFill>
               </a14:hiddenFill>
             </a:ext>
             <a:ext uri="{FAA26D3D-D897-4be2-8F04-BA451C77F1D7}">
-              <ma14:placeholderFlag xmlns="" xmlns:ma14="http://schemas.microsoft.com/office/mac/drawingml/2011/main" val="1"/>
+              <ma14:placeholderFlag xmlns:ma14="http://schemas.microsoft.com/office/mac/drawingml/2011/main" xmlns="" val="1"/>
             </a:ext>
           </a:extLst>
         </p:spPr>
@@ -636,14 +636,14 @@
           <a:noFill/>
           <a:extLst>
             <a:ext uri="{909E8E84-426E-40dd-AFC4-6F175D3DCCD1}">
-              <a14:hiddenFill xmlns="" xmlns:a14="http://schemas.microsoft.com/office/drawing/2010/main">
+              <a14:hiddenFill xmlns:a14="http://schemas.microsoft.com/office/drawing/2010/main" xmlns="">
                 <a:solidFill>
                   <a:srgbClr val="FFFFFF"/>
                 </a:solidFill>
               </a14:hiddenFill>
             </a:ext>
             <a:ext uri="{91240B29-F687-4f45-9708-019B960494DF}">
-              <a14:hiddenLine xmlns="" xmlns:a14="http://schemas.microsoft.com/office/drawing/2010/main" w="9525">
+              <a14:hiddenLine xmlns:a14="http://schemas.microsoft.com/office/drawing/2010/main" xmlns="" w="9525">
                 <a:solidFill>
                   <a:srgbClr val="000000"/>
                 </a:solidFill>
@@ -653,7 +653,7 @@
               </a14:hiddenLine>
             </a:ext>
             <a:ext uri="{FAA26D3D-D897-4be2-8F04-BA451C77F1D7}">
-              <ma14:placeholderFlag xmlns="" xmlns:ma14="http://schemas.microsoft.com/office/mac/drawingml/2011/main" val="1"/>
+              <ma14:placeholderFlag xmlns:ma14="http://schemas.microsoft.com/office/mac/drawingml/2011/main" xmlns="" val="1"/>
             </a:ext>
           </a:extLst>
         </p:spPr>
@@ -693,14 +693,14 @@
           <a:noFill/>
           <a:extLst>
             <a:ext uri="{909E8E84-426E-40dd-AFC4-6F175D3DCCD1}">
-              <a14:hiddenFill xmlns="" xmlns:a14="http://schemas.microsoft.com/office/drawing/2010/main">
+              <a14:hiddenFill xmlns:a14="http://schemas.microsoft.com/office/drawing/2010/main" xmlns="">
                 <a:solidFill>
                   <a:srgbClr val="FFFFFF"/>
                 </a:solidFill>
               </a14:hiddenFill>
             </a:ext>
             <a:ext uri="{91240B29-F687-4f45-9708-019B960494DF}">
-              <a14:hiddenLine xmlns="" xmlns:a14="http://schemas.microsoft.com/office/drawing/2010/main" w="9525">
+              <a14:hiddenLine xmlns:a14="http://schemas.microsoft.com/office/drawing/2010/main" xmlns="" w="9525">
                 <a:solidFill>
                   <a:srgbClr val="000000"/>
                 </a:solidFill>
@@ -984,7 +984,7 @@
               <a:pPr>
                 <a:defRPr/>
               </a:pPr>
-              <a:t>7/26/2024</a:t>
+              <a:t>7/27/2024</a:t>
             </a:fld>
             <a:endParaRPr lang="en-US" altLang="en-US"/>
           </a:p>
@@ -1181,7 +1181,7 @@
               <a:pPr>
                 <a:defRPr/>
               </a:pPr>
-              <a:t>7/26/2024</a:t>
+              <a:t>7/27/2024</a:t>
             </a:fld>
             <a:endParaRPr lang="en-US" altLang="en-US"/>
           </a:p>
@@ -1388,7 +1388,7 @@
               <a:pPr>
                 <a:defRPr/>
               </a:pPr>
-              <a:t>7/26/2024</a:t>
+              <a:t>7/27/2024</a:t>
             </a:fld>
             <a:endParaRPr lang="en-US" altLang="en-US"/>
           </a:p>
@@ -1585,7 +1585,7 @@
               <a:pPr>
                 <a:defRPr/>
               </a:pPr>
-              <a:t>7/26/2024</a:t>
+              <a:t>7/27/2024</a:t>
             </a:fld>
             <a:endParaRPr lang="en-US" altLang="en-US"/>
           </a:p>
@@ -1856,7 +1856,7 @@
               <a:pPr>
                 <a:defRPr/>
               </a:pPr>
-              <a:t>7/26/2024</a:t>
+              <a:t>7/27/2024</a:t>
             </a:fld>
             <a:endParaRPr lang="en-US" altLang="en-US"/>
           </a:p>
@@ -2115,7 +2115,7 @@
               <a:pPr>
                 <a:defRPr/>
               </a:pPr>
-              <a:t>7/26/2024</a:t>
+              <a:t>7/27/2024</a:t>
             </a:fld>
             <a:endParaRPr lang="en-US" altLang="en-US"/>
           </a:p>
@@ -2509,7 +2509,7 @@
               <a:pPr>
                 <a:defRPr/>
               </a:pPr>
-              <a:t>7/26/2024</a:t>
+              <a:t>7/27/2024</a:t>
             </a:fld>
             <a:endParaRPr lang="en-US" altLang="en-US"/>
           </a:p>
@@ -2654,7 +2654,7 @@
               <a:pPr>
                 <a:defRPr/>
               </a:pPr>
-              <a:t>7/26/2024</a:t>
+              <a:t>7/27/2024</a:t>
             </a:fld>
             <a:endParaRPr lang="en-US" altLang="en-US"/>
           </a:p>
@@ -2776,7 +2776,7 @@
               <a:pPr>
                 <a:defRPr/>
               </a:pPr>
-              <a:t>7/26/2024</a:t>
+              <a:t>7/27/2024</a:t>
             </a:fld>
             <a:endParaRPr lang="en-US" altLang="en-US"/>
           </a:p>
@@ -3080,7 +3080,7 @@
               <a:pPr>
                 <a:defRPr/>
               </a:pPr>
-              <a:t>7/26/2024</a:t>
+              <a:t>7/27/2024</a:t>
             </a:fld>
             <a:endParaRPr lang="en-US" altLang="en-US"/>
           </a:p>
@@ -3366,7 +3366,7 @@
               <a:pPr>
                 <a:defRPr/>
               </a:pPr>
-              <a:t>7/26/2024</a:t>
+              <a:t>7/27/2024</a:t>
             </a:fld>
             <a:endParaRPr lang="en-US" altLang="en-US"/>
           </a:p>
@@ -3493,14 +3493,14 @@
           </a:ln>
           <a:extLst>
             <a:ext uri="{909E8E84-426E-40dd-AFC4-6F175D3DCCD1}">
-              <a14:hiddenFill xmlns="" xmlns:a14="http://schemas.microsoft.com/office/drawing/2010/main">
+              <a14:hiddenFill xmlns:a14="http://schemas.microsoft.com/office/drawing/2010/main" xmlns="">
                 <a:solidFill>
                   <a:srgbClr val="FFFFFF"/>
                 </a:solidFill>
               </a14:hiddenFill>
             </a:ext>
             <a:ext uri="{91240B29-F687-4f45-9708-019B960494DF}">
-              <a14:hiddenLine xmlns="" xmlns:a14="http://schemas.microsoft.com/office/drawing/2010/main" w="9525">
+              <a14:hiddenLine xmlns:a14="http://schemas.microsoft.com/office/drawing/2010/main" xmlns="" w="9525">
                 <a:solidFill>
                   <a:srgbClr val="000000"/>
                 </a:solidFill>
@@ -3510,7 +3510,7 @@
               </a14:hiddenLine>
             </a:ext>
             <a:ext uri="{FAA26D3D-D897-4be2-8F04-BA451C77F1D7}">
-              <ma14:placeholderFlag xmlns="" xmlns:ma14="http://schemas.microsoft.com/office/mac/drawingml/2011/main" val="1"/>
+              <ma14:placeholderFlag xmlns:ma14="http://schemas.microsoft.com/office/mac/drawingml/2011/main" xmlns="" val="1"/>
             </a:ext>
           </a:extLst>
         </p:spPr>
@@ -3554,14 +3554,14 @@
           </a:ln>
           <a:extLst>
             <a:ext uri="{909E8E84-426E-40dd-AFC4-6F175D3DCCD1}">
-              <a14:hiddenFill xmlns="" xmlns:a14="http://schemas.microsoft.com/office/drawing/2010/main">
+              <a14:hiddenFill xmlns:a14="http://schemas.microsoft.com/office/drawing/2010/main" xmlns="">
                 <a:solidFill>
                   <a:srgbClr val="FFFFFF"/>
                 </a:solidFill>
               </a14:hiddenFill>
             </a:ext>
             <a:ext uri="{91240B29-F687-4f45-9708-019B960494DF}">
-              <a14:hiddenLine xmlns="" xmlns:a14="http://schemas.microsoft.com/office/drawing/2010/main" w="9525">
+              <a14:hiddenLine xmlns:a14="http://schemas.microsoft.com/office/drawing/2010/main" xmlns="" w="9525">
                 <a:solidFill>
                   <a:srgbClr val="000000"/>
                 </a:solidFill>
@@ -3571,7 +3571,7 @@
               </a14:hiddenLine>
             </a:ext>
             <a:ext uri="{FAA26D3D-D897-4be2-8F04-BA451C77F1D7}">
-              <ma14:placeholderFlag xmlns="" xmlns:ma14="http://schemas.microsoft.com/office/mac/drawingml/2011/main" val="1"/>
+              <ma14:placeholderFlag xmlns:ma14="http://schemas.microsoft.com/office/mac/drawingml/2011/main" xmlns="" val="1"/>
             </a:ext>
           </a:extLst>
         </p:spPr>
@@ -3662,7 +3662,7 @@
               <a:pPr>
                 <a:defRPr/>
               </a:pPr>
-              <a:t>7/26/2024</a:t>
+              <a:t>7/27/2024</a:t>
             </a:fld>
             <a:endParaRPr lang="en-US" altLang="en-US"/>
           </a:p>
@@ -4395,7 +4395,7 @@
           </a:ln>
           <a:extLst>
             <a:ext uri="{91240B29-F687-4f45-9708-019B960494DF}">
-              <a14:hiddenLine xmlns="" xmlns:a14="http://schemas.microsoft.com/office/drawing/2010/main" w="9525">
+              <a14:hiddenLine xmlns:a14="http://schemas.microsoft.com/office/drawing/2010/main" xmlns="" w="9525">
                 <a:solidFill>
                   <a:srgbClr val="000000"/>
                 </a:solidFill>
@@ -4639,7 +4639,7 @@
             </a:ln>
             <a:extLst>
               <a:ext uri="{909E8E84-426E-40dd-AFC4-6F175D3DCCD1}">
-                <a14:hiddenFill xmlns="" xmlns:a14="http://schemas.microsoft.com/office/drawing/2010/main">
+                <a14:hiddenFill xmlns:a14="http://schemas.microsoft.com/office/drawing/2010/main" xmlns="">
                   <a:solidFill>
                     <a:srgbClr val="FFFFFF"/>
                   </a:solidFill>
@@ -5171,9 +5171,9 @@
         <p:grpSpPr bwMode="auto">
           <a:xfrm>
             <a:off x="363538" y="9677256"/>
-            <a:ext cx="14235112" cy="22685383"/>
+            <a:ext cx="14235112" cy="24532042"/>
             <a:chOff x="432287" y="4361588"/>
-            <a:chExt cx="13700233" cy="12351110"/>
+            <a:chExt cx="13700233" cy="13356527"/>
           </a:xfrm>
         </p:grpSpPr>
         <p:sp>
@@ -5187,7 +5187,7 @@
           <p:spPr bwMode="auto">
             <a:xfrm>
               <a:off x="432287" y="4848765"/>
-              <a:ext cx="13700233" cy="11863933"/>
+              <a:ext cx="13700233" cy="12869350"/>
             </a:xfrm>
             <a:prstGeom prst="rect">
               <a:avLst/>
@@ -5201,7 +5201,7 @@
             </a:ln>
             <a:extLst>
               <a:ext uri="{909E8E84-426E-40dd-AFC4-6F175D3DCCD1}">
-                <a14:hiddenFill xmlns="" xmlns:a14="http://schemas.microsoft.com/office/drawing/2010/main">
+                <a14:hiddenFill xmlns:a14="http://schemas.microsoft.com/office/drawing/2010/main" xmlns="">
                   <a:solidFill>
                     <a:srgbClr val="FFFFFF"/>
                   </a:solidFill>
@@ -5343,13 +5343,48 @@
                   <a:latin typeface="Arial" panose="020B0604020202020204" pitchFamily="34" charset="0"/>
                   <a:cs typeface="Arial" panose="020B0604020202020204" pitchFamily="34" charset="0"/>
                 </a:rPr>
-                <a:t>As with almost any project a handful of software libraries and tools were used to realize the experiments, first as an </a:t>
+                <a:t>For the project, we used </a:t>
+              </a:r>
+              <a:r>
+                <a:rPr lang="en-US" sz="3000" b="1" dirty="0" err="1">
+                  <a:latin typeface="Arial" panose="020B0604020202020204" pitchFamily="34" charset="0"/>
+                  <a:cs typeface="Arial" panose="020B0604020202020204" pitchFamily="34" charset="0"/>
+                </a:rPr>
+                <a:t>Jupyter</a:t>
               </a:r>
               <a:r>
                 <a:rPr lang="en-US" sz="3000" b="1" dirty="0">
                   <a:latin typeface="Arial" panose="020B0604020202020204" pitchFamily="34" charset="0"/>
                   <a:cs typeface="Arial" panose="020B0604020202020204" pitchFamily="34" charset="0"/>
                 </a:rPr>
+                <a:t> Notebook </a:t>
+              </a:r>
+              <a:r>
+                <a:rPr lang="en-US" sz="3000" dirty="0">
+                  <a:latin typeface="Arial" panose="020B0604020202020204" pitchFamily="34" charset="0"/>
+                  <a:cs typeface="Arial" panose="020B0604020202020204" pitchFamily="34" charset="0"/>
+                </a:rPr>
+                <a:t>and </a:t>
+              </a:r>
+              <a:r>
+                <a:rPr lang="en-US" sz="3000" b="1" dirty="0">
+                  <a:latin typeface="Arial" panose="020B0604020202020204" pitchFamily="34" charset="0"/>
+                  <a:cs typeface="Arial" panose="020B0604020202020204" pitchFamily="34" charset="0"/>
+                </a:rPr>
+                <a:t>Visual Studio Code</a:t>
+              </a:r>
+              <a:r>
+                <a:rPr lang="en-US" sz="3000" dirty="0">
+                  <a:latin typeface="Arial" panose="020B0604020202020204" pitchFamily="34" charset="0"/>
+                  <a:cs typeface="Arial" panose="020B0604020202020204" pitchFamily="34" charset="0"/>
+                </a:rPr>
+                <a:t> as the </a:t>
+              </a:r>
+              <a:r>
+                <a:rPr lang="en-US" sz="3000" b="1" dirty="0">
+                  <a:latin typeface="Arial" panose="020B0604020202020204" pitchFamily="34" charset="0"/>
+                  <a:cs typeface="Arial" panose="020B0604020202020204" pitchFamily="34" charset="0"/>
+                </a:rPr>
                 <a:t>IDE</a:t>
               </a:r>
               <a:r>
@@ -5357,161 +5392,169 @@
                   <a:latin typeface="Arial" panose="020B0604020202020204" pitchFamily="34" charset="0"/>
                   <a:cs typeface="Arial" panose="020B0604020202020204" pitchFamily="34" charset="0"/>
                 </a:rPr>
-                <a:t> (Integrated Development Environment) </a:t>
+                <a:t> and code </a:t>
+              </a:r>
+              <a:r>
+                <a:rPr lang="en-US" sz="3000" b="1" dirty="0">
+                  <a:latin typeface="Arial" panose="020B0604020202020204" pitchFamily="34" charset="0"/>
+                  <a:cs typeface="Arial" panose="020B0604020202020204" pitchFamily="34" charset="0"/>
+                </a:rPr>
+                <a:t>editor</a:t>
+              </a:r>
+              <a:r>
+                <a:rPr lang="en-US" sz="3000" dirty="0">
+                  <a:latin typeface="Arial" panose="020B0604020202020204" pitchFamily="34" charset="0"/>
+                  <a:cs typeface="Arial" panose="020B0604020202020204" pitchFamily="34" charset="0"/>
+                </a:rPr>
+                <a:t>, respectively. The primary language was </a:t>
+              </a:r>
+              <a:r>
+                <a:rPr lang="en-US" sz="3000" b="1" dirty="0">
+                  <a:latin typeface="Arial" panose="020B0604020202020204" pitchFamily="34" charset="0"/>
+                  <a:cs typeface="Arial" panose="020B0604020202020204" pitchFamily="34" charset="0"/>
+                </a:rPr>
+                <a:t>Python</a:t>
+              </a:r>
+              <a:r>
+                <a:rPr lang="en-US" sz="3000" dirty="0">
+                  <a:latin typeface="Arial" panose="020B0604020202020204" pitchFamily="34" charset="0"/>
+                  <a:cs typeface="Arial" panose="020B0604020202020204" pitchFamily="34" charset="0"/>
+                </a:rPr>
+                <a:t>, and we utilized </a:t>
+              </a:r>
+              <a:r>
+                <a:rPr lang="en-US" sz="3000" b="1" dirty="0">
+                  <a:latin typeface="Arial" panose="020B0604020202020204" pitchFamily="34" charset="0"/>
+                  <a:cs typeface="Arial" panose="020B0604020202020204" pitchFamily="34" charset="0"/>
+                </a:rPr>
+                <a:t>Pandas</a:t>
+              </a:r>
+              <a:r>
+                <a:rPr lang="en-US" sz="3000" dirty="0">
+                  <a:latin typeface="Arial" panose="020B0604020202020204" pitchFamily="34" charset="0"/>
+                  <a:cs typeface="Arial" panose="020B0604020202020204" pitchFamily="34" charset="0"/>
+                </a:rPr>
+                <a:t> for data management, </a:t>
+              </a:r>
+              <a:r>
+                <a:rPr lang="en-US" sz="3000" b="1" dirty="0">
+                  <a:latin typeface="Arial" panose="020B0604020202020204" pitchFamily="34" charset="0"/>
+                  <a:cs typeface="Arial" panose="020B0604020202020204" pitchFamily="34" charset="0"/>
+                </a:rPr>
+                <a:t>NumPy</a:t>
+              </a:r>
+              <a:r>
+                <a:rPr lang="en-US" sz="3000" dirty="0">
+                  <a:latin typeface="Arial" panose="020B0604020202020204" pitchFamily="34" charset="0"/>
+                  <a:cs typeface="Arial" panose="020B0604020202020204" pitchFamily="34" charset="0"/>
+                </a:rPr>
+                <a:t> for mathematical operations, </a:t>
+              </a:r>
+              <a:r>
+                <a:rPr lang="en-US" sz="3000" b="1" dirty="0">
+                  <a:latin typeface="Arial" panose="020B0604020202020204" pitchFamily="34" charset="0"/>
+                  <a:cs typeface="Arial" panose="020B0604020202020204" pitchFamily="34" charset="0"/>
+                </a:rPr>
+                <a:t>matplotlib</a:t>
+              </a:r>
+              <a:r>
+                <a:rPr lang="en-US" sz="3000" dirty="0">
+                  <a:latin typeface="Arial" panose="020B0604020202020204" pitchFamily="34" charset="0"/>
+                  <a:cs typeface="Arial" panose="020B0604020202020204" pitchFamily="34" charset="0"/>
+                </a:rPr>
+                <a:t> for plotting, and </a:t>
+              </a:r>
+              <a:r>
+                <a:rPr lang="en-US" sz="3000" b="1" dirty="0">
+                  <a:latin typeface="Arial" panose="020B0604020202020204" pitchFamily="34" charset="0"/>
+                  <a:cs typeface="Arial" panose="020B0604020202020204" pitchFamily="34" charset="0"/>
+                </a:rPr>
+                <a:t>scikit-learn</a:t>
+              </a:r>
+              <a:r>
+                <a:rPr lang="en-US" sz="3000" dirty="0">
+                  <a:latin typeface="Arial" panose="020B0604020202020204" pitchFamily="34" charset="0"/>
+                  <a:cs typeface="Arial" panose="020B0604020202020204" pitchFamily="34" charset="0"/>
+                </a:rPr>
+                <a:t> and </a:t>
               </a:r>
               <a:r>
                 <a:rPr lang="en-US" sz="3000" b="1" dirty="0" err="1">
                   <a:latin typeface="Arial" panose="020B0604020202020204" pitchFamily="34" charset="0"/>
                   <a:cs typeface="Arial" panose="020B0604020202020204" pitchFamily="34" charset="0"/>
                 </a:rPr>
-                <a:t>Jupyter</a:t>
+                <a:t>Tensorflow</a:t>
+              </a:r>
+              <a:r>
+                <a:rPr lang="en-US" sz="3000" dirty="0">
+                  <a:latin typeface="Arial" panose="020B0604020202020204" pitchFamily="34" charset="0"/>
+                  <a:cs typeface="Arial" panose="020B0604020202020204" pitchFamily="34" charset="0"/>
+                </a:rPr>
+                <a:t> for machine learning. Additionally, we employed NLP techniques and specific </a:t>
               </a:r>
               <a:r>
                 <a:rPr lang="en-US" sz="3000" b="1" dirty="0">
                   <a:latin typeface="Arial" panose="020B0604020202020204" pitchFamily="34" charset="0"/>
                   <a:cs typeface="Arial" panose="020B0604020202020204" pitchFamily="34" charset="0"/>
                 </a:rPr>
-                <a:t> Notebook </a:t>
+                <a:t>NLP</a:t>
               </a:r>
               <a:r>
                 <a:rPr lang="en-US" sz="3000" dirty="0">
                   <a:latin typeface="Arial" panose="020B0604020202020204" pitchFamily="34" charset="0"/>
                   <a:cs typeface="Arial" panose="020B0604020202020204" pitchFamily="34" charset="0"/>
                 </a:rPr>
-                <a:t>was used and </a:t>
+                <a:t> tokenization techniques using </a:t>
               </a:r>
               <a:r>
                 <a:rPr lang="en-US" sz="3000" b="1" dirty="0">
                   <a:latin typeface="Arial" panose="020B0604020202020204" pitchFamily="34" charset="0"/>
                   <a:cs typeface="Arial" panose="020B0604020202020204" pitchFamily="34" charset="0"/>
                 </a:rPr>
-                <a:t>Visual Studio </a:t>
+                <a:t>NLTK's</a:t>
               </a:r>
               <a:r>
                 <a:rPr lang="en-US" sz="3000" dirty="0">
                   <a:latin typeface="Arial" panose="020B0604020202020204" pitchFamily="34" charset="0"/>
                   <a:cs typeface="Arial" panose="020B0604020202020204" pitchFamily="34" charset="0"/>
                 </a:rPr>
-                <a:t>code as an editor. The programming language used was Python, and libraries such as </a:t>
+                <a:t> </a:t>
               </a:r>
               <a:r>
                 <a:rPr lang="en-US" sz="3000" b="1" dirty="0">
                   <a:latin typeface="Arial" panose="020B0604020202020204" pitchFamily="34" charset="0"/>
                   <a:cs typeface="Arial" panose="020B0604020202020204" pitchFamily="34" charset="0"/>
                 </a:rPr>
-                <a:t>Pandas</a:t>
+                <a:t>'</a:t>
+              </a:r>
+              <a:r>
+                <a:rPr lang="en-US" sz="3000" b="1" dirty="0" err="1">
+                  <a:latin typeface="Arial" panose="020B0604020202020204" pitchFamily="34" charset="0"/>
+                  <a:cs typeface="Arial" panose="020B0604020202020204" pitchFamily="34" charset="0"/>
+                </a:rPr>
+                <a:t>TweetTokenizer</a:t>
               </a:r>
               <a:r>
                 <a:rPr lang="en-US" sz="3000" dirty="0">
                   <a:latin typeface="Arial" panose="020B0604020202020204" pitchFamily="34" charset="0"/>
                   <a:cs typeface="Arial" panose="020B0604020202020204" pitchFamily="34" charset="0"/>
                 </a:rPr>
-                <a:t> for data management, </a:t>
+                <a:t>' and </a:t>
               </a:r>
               <a:r>
                 <a:rPr lang="en-US" sz="3000" b="1" dirty="0">
                   <a:latin typeface="Arial" panose="020B0604020202020204" pitchFamily="34" charset="0"/>
                   <a:cs typeface="Arial" panose="020B0604020202020204" pitchFamily="34" charset="0"/>
                 </a:rPr>
-                <a:t>NumPy</a:t>
+                <a:t>'WordNet</a:t>
               </a:r>
               <a:r>
                 <a:rPr lang="en-US" sz="3000" dirty="0">
                   <a:latin typeface="Arial" panose="020B0604020202020204" pitchFamily="34" charset="0"/>
                   <a:cs typeface="Arial" panose="020B0604020202020204" pitchFamily="34" charset="0"/>
                 </a:rPr>
-                <a:t> for some mathematical operations, </a:t>
-              </a:r>
-              <a:r>
-                <a:rPr lang="en-US" sz="3000" b="1" dirty="0">
-                  <a:latin typeface="Arial" panose="020B0604020202020204" pitchFamily="34" charset="0"/>
-                  <a:cs typeface="Arial" panose="020B0604020202020204" pitchFamily="34" charset="0"/>
-                </a:rPr>
-                <a:t>matplotlib</a:t>
-              </a:r>
-              <a:r>
-                <a:rPr lang="en-US" sz="3000" dirty="0">
-                  <a:latin typeface="Arial" panose="020B0604020202020204" pitchFamily="34" charset="0"/>
-                  <a:cs typeface="Arial" panose="020B0604020202020204" pitchFamily="34" charset="0"/>
-                </a:rPr>
-                <a:t> to plot graphs, </a:t>
-              </a:r>
-              <a:r>
-                <a:rPr lang="en-US" sz="3000" b="1" dirty="0">
-                  <a:latin typeface="Arial" panose="020B0604020202020204" pitchFamily="34" charset="0"/>
-                  <a:cs typeface="Arial" panose="020B0604020202020204" pitchFamily="34" charset="0"/>
-                </a:rPr>
-                <a:t>scikit-learn,</a:t>
-              </a:r>
-              <a:r>
-                <a:rPr lang="en-US" sz="3000" dirty="0">
-                  <a:latin typeface="Arial" panose="020B0604020202020204" pitchFamily="34" charset="0"/>
-                  <a:cs typeface="Arial" panose="020B0604020202020204" pitchFamily="34" charset="0"/>
-                </a:rPr>
-                <a:t> and </a:t>
-              </a:r>
-              <a:r>
-                <a:rPr lang="en-US" sz="3000" b="1" dirty="0" err="1">
-                  <a:latin typeface="Arial" panose="020B0604020202020204" pitchFamily="34" charset="0"/>
-                  <a:cs typeface="Arial" panose="020B0604020202020204" pitchFamily="34" charset="0"/>
-                </a:rPr>
-                <a:t>Tensorflow</a:t>
-              </a:r>
-              <a:r>
-                <a:rPr lang="en-US" sz="3000" dirty="0">
-                  <a:latin typeface="Arial" panose="020B0604020202020204" pitchFamily="34" charset="0"/>
-                  <a:cs typeface="Arial" panose="020B0604020202020204" pitchFamily="34" charset="0"/>
-                </a:rPr>
-                <a:t> for machine learning models. Some NLP techniques, and finally, </a:t>
-              </a:r>
-              <a:r>
-                <a:rPr lang="en-US" sz="3000" b="1" dirty="0">
-                  <a:latin typeface="Arial" panose="020B0604020202020204" pitchFamily="34" charset="0"/>
-                  <a:cs typeface="Arial" panose="020B0604020202020204" pitchFamily="34" charset="0"/>
-                </a:rPr>
-                <a:t>NLTK</a:t>
-              </a:r>
-              <a:r>
-                <a:rPr lang="en-US" sz="3000" dirty="0">
-                  <a:latin typeface="Arial" panose="020B0604020202020204" pitchFamily="34" charset="0"/>
-                  <a:cs typeface="Arial" panose="020B0604020202020204" pitchFamily="34" charset="0"/>
-                </a:rPr>
-                <a:t> provided some NLP tokenization techniques specific to the ‘</a:t>
-              </a:r>
-              <a:r>
-                <a:rPr lang="en-US" sz="3000" b="1" dirty="0" err="1">
-                  <a:latin typeface="Arial" panose="020B0604020202020204" pitchFamily="34" charset="0"/>
-                  <a:cs typeface="Arial" panose="020B0604020202020204" pitchFamily="34" charset="0"/>
-                </a:rPr>
-                <a:t>TweetTokenizer</a:t>
-              </a:r>
-              <a:r>
-                <a:rPr lang="en-US" sz="3000" dirty="0">
-                  <a:latin typeface="Arial" panose="020B0604020202020204" pitchFamily="34" charset="0"/>
-                  <a:cs typeface="Arial" panose="020B0604020202020204" pitchFamily="34" charset="0"/>
-                </a:rPr>
-                <a:t>’, and the virtual dictionary ‘</a:t>
-              </a:r>
-              <a:r>
-                <a:rPr lang="en-US" sz="3000" b="1" dirty="0">
-                  <a:latin typeface="Arial" panose="020B0604020202020204" pitchFamily="34" charset="0"/>
-                  <a:cs typeface="Arial" panose="020B0604020202020204" pitchFamily="34" charset="0"/>
-                </a:rPr>
-                <a:t>WordNet</a:t>
-              </a:r>
-              <a:r>
-                <a:rPr lang="en-US" sz="3000" dirty="0">
-                  <a:latin typeface="Arial" panose="020B0604020202020204" pitchFamily="34" charset="0"/>
-                  <a:cs typeface="Arial" panose="020B0604020202020204" pitchFamily="34" charset="0"/>
-                </a:rPr>
-                <a:t>’.</a:t>
-              </a:r>
-            </a:p>
-            <a:p>
-              <a:pPr>
-                <a:buFont typeface="Arial" panose="020B0604020202020204" pitchFamily="34" charset="0"/>
-                <a:buChar char="•"/>
-              </a:pPr>
+                <a:t>' virtual dictionary.</a:t>
+              </a:r>
               <a:endParaRPr lang="en-US" sz="3000" b="1" dirty="0">
                 <a:latin typeface="Arial" panose="020B0604020202020204" pitchFamily="34" charset="0"/>
                 <a:cs typeface="Arial" panose="020B0604020202020204" pitchFamily="34" charset="0"/>
@@ -5561,16 +5604,13 @@
               </a:r>
             </a:p>
             <a:p>
-              <a:pPr lvl="1">
-                <a:buFont typeface="Arial" panose="020B0604020202020204" pitchFamily="34" charset="0"/>
-                <a:buChar char="•"/>
-              </a:pPr>
+              <a:pPr marL="457200" lvl="1" indent="0"/>
               <a:r>
                 <a:rPr lang="en-US" sz="3000" dirty="0">
                   <a:latin typeface="Arial" panose="020B0604020202020204" pitchFamily="34" charset="0"/>
                   <a:cs typeface="Arial" panose="020B0604020202020204" pitchFamily="34" charset="0"/>
                 </a:rPr>
-                <a:t>The NLP techniques are used to preprocess human language (in this case English) and turn it into an understandable computer language, like numbers, and then these numbers will be fed into the machine learning model to make predictions. There are several steps to follow and the order that was taken for this research was the next one:</a:t>
+                <a:t>NLP techniques preprocess human language, like English, into a computer-readable format, such as numbers. These numbers are then used in a machine learning model to make predictions:</a:t>
               </a:r>
             </a:p>
             <a:p>
@@ -5739,6 +5779,86 @@
                 </a:rPr>
                 <a:t>library</a:t>
               </a:r>
+            </a:p>
+            <a:p>
+              <a:pPr lvl="1">
+                <a:buFont typeface="Arial" panose="020B0604020202020204" pitchFamily="34" charset="0"/>
+                <a:buChar char="•"/>
+              </a:pPr>
+              <a:r>
+                <a:rPr lang="en-US" sz="3000" b="1" dirty="0">
+                  <a:latin typeface="Arial" panose="020B0604020202020204" pitchFamily="34" charset="0"/>
+                  <a:cs typeface="Arial" panose="020B0604020202020204" pitchFamily="34" charset="0"/>
+                </a:rPr>
+                <a:t>Embedding: </a:t>
+              </a:r>
+              <a:r>
+                <a:rPr lang="en-US" sz="3000" dirty="0">
+                  <a:latin typeface="Arial" panose="020B0604020202020204" pitchFamily="34" charset="0"/>
+                  <a:cs typeface="Arial" panose="020B0604020202020204" pitchFamily="34" charset="0"/>
+                </a:rPr>
+                <a:t>The process of embedding is the process to give sentiment to words and thus sentences, there are several techniques to give sentiment to words, and a handful of them were applied to observe their effects during the training. The techniques that were applied were:</a:t>
+              </a:r>
+              <a:endParaRPr lang="en-US" sz="3000" b="1" dirty="0">
+                <a:latin typeface="Arial" panose="020B0604020202020204" pitchFamily="34" charset="0"/>
+                <a:cs typeface="Arial" panose="020B0604020202020204" pitchFamily="34" charset="0"/>
+              </a:endParaRPr>
+            </a:p>
+            <a:p>
+              <a:pPr lvl="2">
+                <a:buFont typeface="Arial" panose="020B0604020202020204" pitchFamily="34" charset="0"/>
+                <a:buChar char="•"/>
+              </a:pPr>
+              <a:r>
+                <a:rPr lang="en-US" sz="3000" b="1" dirty="0">
+                  <a:latin typeface="Arial" panose="020B0604020202020204" pitchFamily="34" charset="0"/>
+                  <a:cs typeface="Arial" panose="020B0604020202020204" pitchFamily="34" charset="0"/>
+                </a:rPr>
+                <a:t>Count Vectorizer</a:t>
+              </a:r>
+            </a:p>
+            <a:p>
+              <a:pPr lvl="2">
+                <a:buFont typeface="Arial" panose="020B0604020202020204" pitchFamily="34" charset="0"/>
+                <a:buChar char="•"/>
+              </a:pPr>
+              <a:r>
+                <a:rPr lang="en-US" sz="3000" b="1" dirty="0">
+                  <a:latin typeface="Arial" panose="020B0604020202020204" pitchFamily="34" charset="0"/>
+                  <a:cs typeface="Arial" panose="020B0604020202020204" pitchFamily="34" charset="0"/>
+                </a:rPr>
+                <a:t>BERT</a:t>
+              </a:r>
+            </a:p>
+            <a:p>
+              <a:pPr lvl="2">
+                <a:buFont typeface="Arial" panose="020B0604020202020204" pitchFamily="34" charset="0"/>
+                <a:buChar char="•"/>
+              </a:pPr>
+              <a:r>
+                <a:rPr lang="en-US" sz="3000" b="1" dirty="0">
+                  <a:latin typeface="Arial" panose="020B0604020202020204" pitchFamily="34" charset="0"/>
+                  <a:cs typeface="Arial" panose="020B0604020202020204" pitchFamily="34" charset="0"/>
+                </a:rPr>
+                <a:t>TF-IDF</a:t>
+              </a:r>
+            </a:p>
+            <a:p>
+              <a:pPr lvl="2">
+                <a:buFont typeface="Arial" panose="020B0604020202020204" pitchFamily="34" charset="0"/>
+                <a:buChar char="•"/>
+              </a:pPr>
+              <a:r>
+                <a:rPr lang="en-US" sz="3000" b="1" dirty="0">
+                  <a:latin typeface="Arial" panose="020B0604020202020204" pitchFamily="34" charset="0"/>
+                  <a:cs typeface="Arial" panose="020B0604020202020204" pitchFamily="34" charset="0"/>
+                </a:rPr>
+                <a:t>Hashing vectorizer</a:t>
+              </a:r>
+              <a:endParaRPr lang="en-US" sz="3000" dirty="0">
+                <a:latin typeface="Arial" panose="020B0604020202020204" pitchFamily="34" charset="0"/>
+                <a:cs typeface="Arial" panose="020B0604020202020204" pitchFamily="34" charset="0"/>
+              </a:endParaRPr>
             </a:p>
             <a:p>
               <a:pPr marL="457200" lvl="1" indent="0"/>
@@ -5950,7 +6070,7 @@
             </a:ln>
             <a:extLst>
               <a:ext uri="{909E8E84-426E-40dd-AFC4-6F175D3DCCD1}">
-                <a14:hiddenFill xmlns="" xmlns:a14="http://schemas.microsoft.com/office/drawing/2010/main">
+                <a14:hiddenFill xmlns:a14="http://schemas.microsoft.com/office/drawing/2010/main" xmlns="">
                   <a:solidFill>
                     <a:srgbClr val="FFFFFF"/>
                   </a:solidFill>
@@ -6289,7 +6409,7 @@
             </a:ln>
             <a:extLst>
               <a:ext uri="{909E8E84-426E-40dd-AFC4-6F175D3DCCD1}">
-                <a14:hiddenFill xmlns="" xmlns:a14="http://schemas.microsoft.com/office/drawing/2010/main">
+                <a14:hiddenFill xmlns:a14="http://schemas.microsoft.com/office/drawing/2010/main" xmlns="">
                   <a:solidFill>
                     <a:srgbClr val="FFFFFF"/>
                   </a:solidFill>
@@ -6628,7 +6748,7 @@
             </a:ln>
             <a:extLst>
               <a:ext uri="{909E8E84-426E-40dd-AFC4-6F175D3DCCD1}">
-                <a14:hiddenFill xmlns="" xmlns:a14="http://schemas.microsoft.com/office/drawing/2010/main">
+                <a14:hiddenFill xmlns:a14="http://schemas.microsoft.com/office/drawing/2010/main" xmlns="">
                   <a:solidFill>
                     <a:srgbClr val="FFFFFF"/>
                   </a:solidFill>
@@ -7099,7 +7219,7 @@
             </a:ln>
             <a:extLst>
               <a:ext uri="{909E8E84-426E-40dd-AFC4-6F175D3DCCD1}">
-                <a14:hiddenFill xmlns="" xmlns:a14="http://schemas.microsoft.com/office/drawing/2010/main">
+                <a14:hiddenFill xmlns:a14="http://schemas.microsoft.com/office/drawing/2010/main" xmlns="">
                   <a:solidFill>
                     <a:srgbClr val="FFFFFF"/>
                   </a:solidFill>
@@ -7404,7 +7524,7 @@
         </p:nvGrpSpPr>
         <p:grpSpPr bwMode="auto">
           <a:xfrm>
-            <a:off x="15024581" y="25455243"/>
+            <a:off x="14633689" y="21438208"/>
             <a:ext cx="14267971" cy="6077839"/>
             <a:chOff x="432287" y="4358829"/>
             <a:chExt cx="13731857" cy="3282367"/>
@@ -7435,7 +7555,7 @@
             </a:ln>
             <a:extLst>
               <a:ext uri="{909E8E84-426E-40dd-AFC4-6F175D3DCCD1}">
-                <a14:hiddenFill xmlns="" xmlns:a14="http://schemas.microsoft.com/office/drawing/2010/main">
+                <a14:hiddenFill xmlns:a14="http://schemas.microsoft.com/office/drawing/2010/main" xmlns="">
                   <a:solidFill>
                     <a:srgbClr val="FFFFFF"/>
                   </a:solidFill>
@@ -7934,9 +8054,9 @@
         <p:grpSpPr bwMode="auto">
           <a:xfrm>
             <a:off x="14796147" y="4278696"/>
-            <a:ext cx="14240654" cy="9758059"/>
+            <a:ext cx="14240654" cy="5603076"/>
             <a:chOff x="432287" y="4365904"/>
-            <a:chExt cx="13705567" cy="5269887"/>
+            <a:chExt cx="13705567" cy="3025968"/>
           </a:xfrm>
         </p:grpSpPr>
         <p:sp>
@@ -7956,7 +8076,7 @@
           <p:spPr bwMode="auto">
             <a:xfrm>
               <a:off x="432287" y="4848764"/>
-              <a:ext cx="13700233" cy="4787027"/>
+              <a:ext cx="13700233" cy="2543108"/>
             </a:xfrm>
             <a:prstGeom prst="rect">
               <a:avLst/>
@@ -7970,7 +8090,7 @@
             </a:ln>
             <a:extLst>
               <a:ext uri="{909E8E84-426E-40dd-AFC4-6F175D3DCCD1}">
-                <a14:hiddenFill xmlns="" xmlns:a14="http://schemas.microsoft.com/office/drawing/2010/main">
+                <a14:hiddenFill xmlns:a14="http://schemas.microsoft.com/office/drawing/2010/main" xmlns="">
                   <a:solidFill>
                     <a:srgbClr val="FFFFFF"/>
                   </a:solidFill>
@@ -8089,92 +8209,6 @@
                 </a:defRPr>
               </a:lvl9pPr>
             </a:lstStyle>
-            <a:p>
-              <a:pPr lvl="1">
-                <a:buFont typeface="Arial" panose="020B0604020202020204" pitchFamily="34" charset="0"/>
-                <a:buChar char="•"/>
-              </a:pPr>
-              <a:r>
-                <a:rPr lang="en-US" sz="3000" b="1" dirty="0">
-                  <a:latin typeface="Arial" panose="020B0604020202020204" pitchFamily="34" charset="0"/>
-                  <a:cs typeface="Arial" panose="020B0604020202020204" pitchFamily="34" charset="0"/>
-                </a:rPr>
-                <a:t>Embedding: </a:t>
-              </a:r>
-              <a:r>
-                <a:rPr lang="en-US" sz="3000" dirty="0">
-                  <a:latin typeface="Arial" panose="020B0604020202020204" pitchFamily="34" charset="0"/>
-                  <a:cs typeface="Arial" panose="020B0604020202020204" pitchFamily="34" charset="0"/>
-                </a:rPr>
-                <a:t>The process of embedding is the process to give sentiment to words and thus sentences, there are several techniques to give sentiment to words, and a handful of them were applied to observe their effects during the training. The techniques that were applied were:</a:t>
-              </a:r>
-              <a:endParaRPr lang="en-US" sz="3000" b="1" dirty="0">
-                <a:latin typeface="Arial" panose="020B0604020202020204" pitchFamily="34" charset="0"/>
-                <a:cs typeface="Arial" panose="020B0604020202020204" pitchFamily="34" charset="0"/>
-              </a:endParaRPr>
-            </a:p>
-            <a:p>
-              <a:pPr lvl="2">
-                <a:buFont typeface="Arial" panose="020B0604020202020204" pitchFamily="34" charset="0"/>
-                <a:buChar char="•"/>
-              </a:pPr>
-              <a:r>
-                <a:rPr lang="en-US" sz="3000" b="1" dirty="0">
-                  <a:latin typeface="Arial" panose="020B0604020202020204" pitchFamily="34" charset="0"/>
-                  <a:cs typeface="Arial" panose="020B0604020202020204" pitchFamily="34" charset="0"/>
-                </a:rPr>
-                <a:t>Count Vectorizer</a:t>
-              </a:r>
-            </a:p>
-            <a:p>
-              <a:pPr lvl="2">
-                <a:buFont typeface="Arial" panose="020B0604020202020204" pitchFamily="34" charset="0"/>
-                <a:buChar char="•"/>
-              </a:pPr>
-              <a:r>
-                <a:rPr lang="en-US" sz="3000" b="1" dirty="0">
-                  <a:latin typeface="Arial" panose="020B0604020202020204" pitchFamily="34" charset="0"/>
-                  <a:cs typeface="Arial" panose="020B0604020202020204" pitchFamily="34" charset="0"/>
-                </a:rPr>
-                <a:t>BERT</a:t>
-              </a:r>
-            </a:p>
-            <a:p>
-              <a:pPr lvl="2">
-                <a:buFont typeface="Arial" panose="020B0604020202020204" pitchFamily="34" charset="0"/>
-                <a:buChar char="•"/>
-              </a:pPr>
-              <a:r>
-                <a:rPr lang="en-US" sz="3000" b="1" dirty="0">
-                  <a:latin typeface="Arial" panose="020B0604020202020204" pitchFamily="34" charset="0"/>
-                  <a:cs typeface="Arial" panose="020B0604020202020204" pitchFamily="34" charset="0"/>
-                </a:rPr>
-                <a:t>TF-IDF</a:t>
-              </a:r>
-            </a:p>
-            <a:p>
-              <a:pPr lvl="2">
-                <a:buFont typeface="Arial" panose="020B0604020202020204" pitchFamily="34" charset="0"/>
-                <a:buChar char="•"/>
-              </a:pPr>
-              <a:r>
-                <a:rPr lang="en-US" sz="3000" b="1" dirty="0">
-                  <a:latin typeface="Arial" panose="020B0604020202020204" pitchFamily="34" charset="0"/>
-                  <a:cs typeface="Arial" panose="020B0604020202020204" pitchFamily="34" charset="0"/>
-                </a:rPr>
-                <a:t>Hashing vectorizer</a:t>
-              </a:r>
-            </a:p>
-            <a:p>
-              <a:pPr lvl="2">
-                <a:buFont typeface="Arial" panose="020B0604020202020204" pitchFamily="34" charset="0"/>
-                <a:buChar char="•"/>
-              </a:pPr>
-              <a:endParaRPr lang="en-US" sz="3000" b="1" dirty="0">
-                <a:latin typeface="Arial" panose="020B0604020202020204" pitchFamily="34" charset="0"/>
-                <a:cs typeface="Arial" panose="020B0604020202020204" pitchFamily="34" charset="0"/>
-              </a:endParaRPr>
-            </a:p>
             <a:p>
               <a:pPr>
                 <a:buFont typeface="Arial" panose="020B0604020202020204" pitchFamily="34" charset="0"/>
@@ -8462,8 +8496,8 @@
         </p:blipFill>
         <p:spPr>
           <a:xfrm>
-            <a:off x="15024581" y="13103875"/>
-            <a:ext cx="12587920" cy="11010846"/>
+            <a:off x="14593107" y="9097117"/>
+            <a:ext cx="14080334" cy="12316283"/>
           </a:xfrm>
           <a:prstGeom prst="rect">
             <a:avLst/>

</xml_diff>